<commit_message>
Added slide notes, lab goal
</commit_message>
<xml_diff>
--- a/335.pptx
+++ b/335.pptx
@@ -5,10 +5,10 @@
     <p:sldMasterId id="2147483801" r:id="rId1"/>
   </p:sldMasterIdLst>
   <p:notesMasterIdLst>
-    <p:notesMasterId r:id="rId16"/>
+    <p:notesMasterId r:id="rId17"/>
   </p:notesMasterIdLst>
   <p:handoutMasterIdLst>
-    <p:handoutMasterId r:id="rId17"/>
+    <p:handoutMasterId r:id="rId18"/>
   </p:handoutMasterIdLst>
   <p:sldIdLst>
     <p:sldId id="256" r:id="rId2"/>
@@ -24,7 +24,8 @@
     <p:sldId id="348" r:id="rId12"/>
     <p:sldId id="349" r:id="rId13"/>
     <p:sldId id="333" r:id="rId14"/>
-    <p:sldId id="329" r:id="rId15"/>
+    <p:sldId id="350" r:id="rId15"/>
+    <p:sldId id="329" r:id="rId16"/>
   </p:sldIdLst>
   <p:sldSz cx="9144000" cy="6858000" type="screen4x3"/>
   <p:notesSz cx="6858000" cy="9144000"/>
@@ -247,7 +248,7 @@
               <a:pPr>
                 <a:defRPr/>
               </a:pPr>
-              <a:t>7/17/11</a:t>
+              <a:t>7/21/11</a:t>
             </a:fld>
             <a:endParaRPr lang="en-US"/>
           </a:p>
@@ -430,7 +431,7 @@
               <a:pPr>
                 <a:defRPr/>
               </a:pPr>
-              <a:t>7/17/11</a:t>
+              <a:t>7/21/11</a:t>
             </a:fld>
             <a:endParaRPr lang="en-US"/>
           </a:p>
@@ -1209,13 +1210,16 @@
           <a:p>
             <a:r>
               <a:rPr lang="en-US" baseline="0" dirty="0" smtClean="0"/>
-              <a:t>Also, remember that web views are among the most computationally expensive UI components. Use them with </a:t>
-            </a:r>
-            <a:r>
-              <a:rPr lang="en-US" baseline="0" smtClean="0"/>
-              <a:t>that forethought.</a:t>
-            </a:r>
-            <a:endParaRPr lang="en-US" baseline="0" dirty="0" smtClean="0"/>
+              <a:t>Also, remember that web views are among the most </a:t>
+            </a:r>
+            <a:r>
+              <a:rPr lang="en-US" baseline="0" dirty="0" smtClean="0"/>
+              <a:t>resource expensive </a:t>
+            </a:r>
+            <a:r>
+              <a:rPr lang="en-US" baseline="0" dirty="0" smtClean="0"/>
+              <a:t>UI components. Use them with that forethought.</a:t>
+            </a:r>
           </a:p>
         </p:txBody>
       </p:sp>
@@ -1252,6 +1256,186 @@
     <p:extLst>
       <p:ext uri="{BB962C8B-B14F-4D97-AF65-F5344CB8AC3E}">
         <p14:creationId xmlns:p14="http://schemas.microsoft.com/office/powerpoint/2010/main" val="4150720913"/>
+      </p:ext>
+    </p:extLst>
+  </p:cSld>
+  <p:clrMapOvr>
+    <a:masterClrMapping/>
+  </p:clrMapOvr>
+</p:notes>
+</file>
+
+<file path=ppt/notesSlides/notesSlide11.xml><?xml version="1.0" encoding="utf-8"?>
+<p:notes xmlns:a="http://schemas.openxmlformats.org/drawingml/2006/main" xmlns:r="http://schemas.openxmlformats.org/officeDocument/2006/relationships" xmlns:p="http://schemas.openxmlformats.org/presentationml/2006/main">
+  <p:cSld>
+    <p:spTree>
+      <p:nvGrpSpPr>
+        <p:cNvPr id="1" name=""/>
+        <p:cNvGrpSpPr/>
+        <p:nvPr/>
+      </p:nvGrpSpPr>
+      <p:grpSpPr>
+        <a:xfrm>
+          <a:off x="0" y="0"/>
+          <a:ext cx="0" cy="0"/>
+          <a:chOff x="0" y="0"/>
+          <a:chExt cx="0" cy="0"/>
+        </a:xfrm>
+      </p:grpSpPr>
+      <p:sp>
+        <p:nvSpPr>
+          <p:cNvPr id="2" name="Slide Image Placeholder 1"/>
+          <p:cNvSpPr>
+            <a:spLocks noGrp="1" noRot="1" noChangeAspect="1"/>
+          </p:cNvSpPr>
+          <p:nvPr>
+            <p:ph type="sldImg"/>
+          </p:nvPr>
+        </p:nvSpPr>
+        <p:spPr/>
+      </p:sp>
+      <p:sp>
+        <p:nvSpPr>
+          <p:cNvPr id="3" name="Notes Placeholder 2"/>
+          <p:cNvSpPr>
+            <a:spLocks noGrp="1"/>
+          </p:cNvSpPr>
+          <p:nvPr>
+            <p:ph type="body" idx="1"/>
+          </p:nvPr>
+        </p:nvSpPr>
+        <p:spPr/>
+        <p:txBody>
+          <a:bodyPr/>
+          <a:lstStyle/>
+          <a:p>
+            <a:endParaRPr lang="en-US" baseline="0" dirty="0" smtClean="0"/>
+          </a:p>
+        </p:txBody>
+      </p:sp>
+      <p:sp>
+        <p:nvSpPr>
+          <p:cNvPr id="4" name="Slide Number Placeholder 3"/>
+          <p:cNvSpPr>
+            <a:spLocks noGrp="1"/>
+          </p:cNvSpPr>
+          <p:nvPr>
+            <p:ph type="sldNum" sz="quarter" idx="10"/>
+          </p:nvPr>
+        </p:nvSpPr>
+        <p:spPr/>
+        <p:txBody>
+          <a:bodyPr/>
+          <a:lstStyle/>
+          <a:p>
+            <a:pPr>
+              <a:defRPr/>
+            </a:pPr>
+            <a:fld id="{C704D923-8FB6-2040-A5D7-BD75ED8E8368}" type="slidenum">
+              <a:rPr lang="en-US" smtClean="0"/>
+              <a:pPr>
+                <a:defRPr/>
+              </a:pPr>
+              <a:t>14</a:t>
+            </a:fld>
+            <a:endParaRPr lang="en-US"/>
+          </a:p>
+        </p:txBody>
+      </p:sp>
+    </p:spTree>
+    <p:extLst>
+      <p:ext uri="{BB962C8B-B14F-4D97-AF65-F5344CB8AC3E}">
+        <p14:creationId xmlns:p14="http://schemas.microsoft.com/office/powerpoint/2010/main" val="4150720913"/>
+      </p:ext>
+    </p:extLst>
+  </p:cSld>
+  <p:clrMapOvr>
+    <a:masterClrMapping/>
+  </p:clrMapOvr>
+</p:notes>
+</file>
+
+<file path=ppt/notesSlides/notesSlide12.xml><?xml version="1.0" encoding="utf-8"?>
+<p:notes xmlns:a="http://schemas.openxmlformats.org/drawingml/2006/main" xmlns:r="http://schemas.openxmlformats.org/officeDocument/2006/relationships" xmlns:p="http://schemas.openxmlformats.org/presentationml/2006/main">
+  <p:cSld>
+    <p:spTree>
+      <p:nvGrpSpPr>
+        <p:cNvPr id="1" name=""/>
+        <p:cNvGrpSpPr/>
+        <p:nvPr/>
+      </p:nvGrpSpPr>
+      <p:grpSpPr>
+        <a:xfrm>
+          <a:off x="0" y="0"/>
+          <a:ext cx="0" cy="0"/>
+          <a:chOff x="0" y="0"/>
+          <a:chExt cx="0" cy="0"/>
+        </a:xfrm>
+      </p:grpSpPr>
+      <p:sp>
+        <p:nvSpPr>
+          <p:cNvPr id="2" name="Slide Image Placeholder 1"/>
+          <p:cNvSpPr>
+            <a:spLocks noGrp="1" noRot="1" noChangeAspect="1"/>
+          </p:cNvSpPr>
+          <p:nvPr>
+            <p:ph type="sldImg"/>
+          </p:nvPr>
+        </p:nvSpPr>
+        <p:spPr/>
+      </p:sp>
+      <p:sp>
+        <p:nvSpPr>
+          <p:cNvPr id="3" name="Notes Placeholder 2"/>
+          <p:cNvSpPr>
+            <a:spLocks noGrp="1"/>
+          </p:cNvSpPr>
+          <p:nvPr>
+            <p:ph type="body" idx="1"/>
+          </p:nvPr>
+        </p:nvSpPr>
+        <p:spPr/>
+        <p:txBody>
+          <a:bodyPr/>
+          <a:lstStyle/>
+          <a:p>
+            <a:endParaRPr lang="en-US" dirty="0"/>
+          </a:p>
+        </p:txBody>
+      </p:sp>
+      <p:sp>
+        <p:nvSpPr>
+          <p:cNvPr id="4" name="Slide Number Placeholder 3"/>
+          <p:cNvSpPr>
+            <a:spLocks noGrp="1"/>
+          </p:cNvSpPr>
+          <p:nvPr>
+            <p:ph type="sldNum" sz="quarter" idx="10"/>
+          </p:nvPr>
+        </p:nvSpPr>
+        <p:spPr/>
+        <p:txBody>
+          <a:bodyPr/>
+          <a:lstStyle/>
+          <a:p>
+            <a:pPr>
+              <a:defRPr/>
+            </a:pPr>
+            <a:fld id="{C704D923-8FB6-2040-A5D7-BD75ED8E8368}" type="slidenum">
+              <a:rPr lang="en-US" smtClean="0"/>
+              <a:pPr>
+                <a:defRPr/>
+              </a:pPr>
+              <a:t>15</a:t>
+            </a:fld>
+            <a:endParaRPr lang="en-US"/>
+          </a:p>
+        </p:txBody>
+      </p:sp>
+    </p:spTree>
+    <p:extLst>
+      <p:ext uri="{BB962C8B-B14F-4D97-AF65-F5344CB8AC3E}">
+        <p14:creationId xmlns:p14="http://schemas.microsoft.com/office/powerpoint/2010/main" val="145029645"/>
       </p:ext>
     </p:extLst>
   </p:cSld>
@@ -2277,7 +2461,23 @@
             </a:r>
             <a:r>
               <a:rPr lang="en-US" baseline="0" dirty="0" smtClean="0"/>
-              <a:t> – screen-size content area with “page” indicator</a:t>
+              <a:t> – screen-size content area with “page” </a:t>
+            </a:r>
+            <a:r>
+              <a:rPr lang="en-US" baseline="0" dirty="0" smtClean="0"/>
+              <a:t>indicator</a:t>
+            </a:r>
+          </a:p>
+          <a:p>
+            <a:r>
+              <a:rPr lang="en-US" baseline="0" dirty="0" smtClean="0"/>
+              <a:t>sort of like a filmstrip of views shown within a container</a:t>
+            </a:r>
+          </a:p>
+          <a:p>
+            <a:r>
+              <a:rPr lang="en-US" baseline="0" dirty="0" smtClean="0"/>
+              <a:t>views snap into place: you can’t end up halfway between views after a swipe</a:t>
             </a:r>
             <a:endParaRPr lang="en-US" dirty="0"/>
           </a:p>
@@ -2369,6 +2569,22 @@
           <a:bodyPr/>
           <a:lstStyle/>
           <a:p>
+            <a:r>
+              <a:rPr lang="en-US" dirty="0" smtClean="0"/>
+              <a:t>Height/width = what’s visible to the user</a:t>
+            </a:r>
+          </a:p>
+          <a:p>
+            <a:r>
+              <a:rPr lang="en-US" dirty="0" smtClean="0"/>
+              <a:t>Content height/width are</a:t>
+            </a:r>
+            <a:r>
+              <a:rPr lang="en-US" baseline="0" dirty="0" smtClean="0"/>
+              <a:t> dimensions of the actual content</a:t>
+            </a:r>
+          </a:p>
+          <a:p>
             <a:endParaRPr lang="en-US" dirty="0"/>
           </a:p>
         </p:txBody>
@@ -2574,7 +2790,21 @@
           <a:bodyPr/>
           <a:lstStyle/>
           <a:p>
-            <a:endParaRPr lang="en-US" dirty="0"/>
+            <a:r>
+              <a:rPr lang="en-US" dirty="0" smtClean="0"/>
+              <a:t>Primary difference from other views would be the scale event</a:t>
+            </a:r>
+          </a:p>
+          <a:p>
+            <a:r>
+              <a:rPr lang="en-US" dirty="0" smtClean="0"/>
+              <a:t>Additional</a:t>
+            </a:r>
+            <a:r>
+              <a:rPr lang="en-US" baseline="0" dirty="0" smtClean="0"/>
+              <a:t> event object properties</a:t>
+            </a:r>
+            <a:endParaRPr lang="en-US" dirty="0" smtClean="0"/>
           </a:p>
         </p:txBody>
       </p:sp>
@@ -2670,13 +2900,34 @@
             </a:r>
             <a:r>
               <a:rPr lang="en-US" baseline="0" dirty="0" smtClean="0"/>
-              <a:t> is an array of standard views that are shown within the </a:t>
+              <a:t> </a:t>
+            </a:r>
+            <a:r>
+              <a:rPr lang="en-US" baseline="0" dirty="0" smtClean="0"/>
+              <a:t>is an array of standard views that are shown within the </a:t>
             </a:r>
             <a:r>
               <a:rPr lang="en-US" baseline="0" dirty="0" err="1" smtClean="0"/>
               <a:t>ScrollableView</a:t>
             </a:r>
             <a:endParaRPr lang="en-US" baseline="0" dirty="0" smtClean="0"/>
+          </a:p>
+          <a:p>
+            <a:endParaRPr lang="en-US" baseline="0" dirty="0" smtClean="0"/>
+          </a:p>
+          <a:p>
+            <a:r>
+              <a:rPr lang="en-US" baseline="0" dirty="0" smtClean="0"/>
+              <a:t>The white-dot paging control is a </a:t>
+            </a:r>
+            <a:r>
+              <a:rPr lang="en-US" baseline="0" dirty="0" err="1" smtClean="0"/>
+              <a:t>iOS</a:t>
+            </a:r>
+            <a:r>
+              <a:rPr lang="en-US" baseline="0" dirty="0" smtClean="0"/>
+              <a:t>-specific UI element</a:t>
+            </a:r>
           </a:p>
           <a:p>
             <a:endParaRPr lang="en-US" baseline="0" dirty="0" smtClean="0"/>
@@ -3252,7 +3503,7 @@
               <a:pPr>
                 <a:defRPr/>
               </a:pPr>
-              <a:t>7/17/11</a:t>
+              <a:t>7/21/11</a:t>
             </a:fld>
             <a:endParaRPr lang="en-US"/>
           </a:p>
@@ -3740,7 +3991,7 @@
               <a:pPr>
                 <a:defRPr/>
               </a:pPr>
-              <a:t>7/17/11</a:t>
+              <a:t>7/21/11</a:t>
             </a:fld>
             <a:endParaRPr lang="en-US"/>
           </a:p>
@@ -4302,7 +4553,7 @@
               <a:pPr>
                 <a:defRPr/>
               </a:pPr>
-              <a:t>7/17/11</a:t>
+              <a:t>7/21/11</a:t>
             </a:fld>
             <a:endParaRPr lang="en-US"/>
           </a:p>
@@ -4912,7 +5163,7 @@
               <a:pPr>
                 <a:defRPr/>
               </a:pPr>
-              <a:t>7/17/11</a:t>
+              <a:t>7/21/11</a:t>
             </a:fld>
             <a:endParaRPr lang="en-US"/>
           </a:p>
@@ -5034,7 +5285,7 @@
               <a:pPr>
                 <a:defRPr/>
               </a:pPr>
-              <a:t>7/17/11</a:t>
+              <a:t>7/21/11</a:t>
             </a:fld>
             <a:endParaRPr lang="en-US"/>
           </a:p>
@@ -5321,7 +5572,7 @@
               <a:pPr>
                 <a:defRPr/>
               </a:pPr>
-              <a:t>7/17/11</a:t>
+              <a:t>7/21/11</a:t>
             </a:fld>
             <a:endParaRPr lang="en-US"/>
           </a:p>
@@ -6912,10 +7163,16 @@
               <a:t>sav.addEventListener</a:t>
             </a:r>
             <a:r>
+              <a:rPr lang="en-US" sz="2000" dirty="0">
+                <a:latin typeface="Monaco" charset="0"/>
+              </a:rPr>
+              <a:t>('scroll</a:t>
+            </a:r>
+            <a:r>
               <a:rPr lang="en-US" sz="2000" dirty="0" smtClean="0">
                 <a:latin typeface="Monaco" charset="0"/>
               </a:rPr>
-              <a:t>('scale'</a:t>
+              <a:t>'</a:t>
             </a:r>
             <a:r>
               <a:rPr lang="en-US" sz="2000" dirty="0">
@@ -6937,19 +7194,49 @@
               <a:rPr lang="en-US" sz="2000" dirty="0">
                 <a:latin typeface="Monaco" charset="0"/>
               </a:rPr>
-              <a:t>	alert('You zoomed </a:t>
+              <a:t>	alert</a:t>
             </a:r>
             <a:r>
               <a:rPr lang="en-US" sz="2000" dirty="0" smtClean="0">
                 <a:latin typeface="Monaco" charset="0"/>
               </a:rPr>
-              <a:t>to ' + scale * 100 + '%</a:t>
+              <a:t>(</a:t>
+            </a:r>
+            <a:r>
+              <a:rPr lang="en-US" sz="2000" dirty="0">
+                <a:latin typeface="Monaco" charset="0"/>
+              </a:rPr>
+              <a:t>'You</a:t>
+            </a:r>
+            <a:r>
+              <a:rPr lang="en-US" sz="2000" dirty="0" smtClean="0">
+                <a:latin typeface="Monaco" charset="0"/>
+              </a:rPr>
+              <a:t>\</a:t>
             </a:r>
             <a:r>
               <a:rPr lang="en-US" sz="2000" dirty="0">
                 <a:latin typeface="Monaco" charset="0"/>
               </a:rPr>
               <a:t>'</a:t>
+            </a:r>
+            <a:r>
+              <a:rPr lang="en-US" sz="2000" dirty="0" smtClean="0">
+                <a:latin typeface="Monaco" charset="0"/>
+              </a:rPr>
+              <a:t>re on page </a:t>
+            </a:r>
+            <a:r>
+              <a:rPr lang="en-US" sz="2000" dirty="0" smtClean="0">
+                <a:latin typeface="Monaco" charset="0"/>
+              </a:rPr>
+              <a:t>' + </a:t>
+            </a:r>
+            <a:r>
+              <a:rPr lang="en-US" sz="2000" dirty="0" err="1" smtClean="0">
+                <a:latin typeface="Monaco" charset="0"/>
+              </a:rPr>
+              <a:t>e.currentPage</a:t>
             </a:r>
             <a:r>
               <a:rPr lang="en-US" sz="2000" dirty="0" smtClean="0">
@@ -7699,7 +7986,7 @@
             </a:pPr>
             <a:r>
               <a:rPr lang="en-US" dirty="0" smtClean="0"/>
-              <a:t>Computational expense</a:t>
+              <a:t>Resource expense</a:t>
             </a:r>
             <a:endParaRPr lang="en-US" dirty="0"/>
           </a:p>
@@ -7858,6 +8145,128 @@
           <a:chExt cx="0" cy="0"/>
         </a:xfrm>
       </p:grpSpPr>
+      <p:sp>
+        <p:nvSpPr>
+          <p:cNvPr id="2" name="Title 1"/>
+          <p:cNvSpPr>
+            <a:spLocks noGrp="1"/>
+          </p:cNvSpPr>
+          <p:nvPr>
+            <p:ph type="title"/>
+          </p:nvPr>
+        </p:nvSpPr>
+        <p:spPr/>
+        <p:txBody>
+          <a:bodyPr/>
+          <a:lstStyle/>
+          <a:p>
+            <a:r>
+              <a:rPr lang="en-US" dirty="0" smtClean="0"/>
+              <a:t>Lab Goals</a:t>
+            </a:r>
+            <a:endParaRPr lang="en-US" dirty="0"/>
+          </a:p>
+        </p:txBody>
+      </p:sp>
+      <p:sp>
+        <p:nvSpPr>
+          <p:cNvPr id="3" name="Content Placeholder 2"/>
+          <p:cNvSpPr>
+            <a:spLocks noGrp="1"/>
+          </p:cNvSpPr>
+          <p:nvPr>
+            <p:ph idx="1"/>
+          </p:nvPr>
+        </p:nvSpPr>
+        <p:spPr/>
+        <p:txBody>
+          <a:bodyPr/>
+          <a:lstStyle/>
+          <a:p>
+            <a:r>
+              <a:rPr lang="en-US" dirty="0" smtClean="0"/>
+              <a:t>Use both </a:t>
+            </a:r>
+            <a:r>
+              <a:rPr lang="en-US" dirty="0" err="1" smtClean="0"/>
+              <a:t>ScrollView</a:t>
+            </a:r>
+            <a:r>
+              <a:rPr lang="en-US" dirty="0" smtClean="0"/>
+              <a:t> and </a:t>
+            </a:r>
+            <a:r>
+              <a:rPr lang="en-US" dirty="0" err="1" smtClean="0"/>
+              <a:t>ScrollableView</a:t>
+            </a:r>
+            <a:r>
+              <a:rPr lang="en-US" dirty="0" smtClean="0"/>
+              <a:t> in an app</a:t>
+            </a:r>
+          </a:p>
+          <a:p>
+            <a:endParaRPr lang="en-US" dirty="0"/>
+          </a:p>
+          <a:p>
+            <a:r>
+              <a:rPr lang="en-US" dirty="0" smtClean="0"/>
+              <a:t>Use </a:t>
+            </a:r>
+            <a:r>
+              <a:rPr lang="en-US" dirty="0" err="1" smtClean="0"/>
+              <a:t>ScrollView</a:t>
+            </a:r>
+            <a:r>
+              <a:rPr lang="en-US" dirty="0" smtClean="0"/>
+              <a:t> as tab-strip style component</a:t>
+            </a:r>
+          </a:p>
+          <a:p>
+            <a:endParaRPr lang="en-US" dirty="0"/>
+          </a:p>
+          <a:p>
+            <a:r>
+              <a:rPr lang="en-US" dirty="0" smtClean="0"/>
+              <a:t>It will control what is shown in the </a:t>
+            </a:r>
+            <a:r>
+              <a:rPr lang="en-US" dirty="0" err="1" smtClean="0"/>
+              <a:t>ScrollableView</a:t>
+            </a:r>
+            <a:endParaRPr lang="en-US" dirty="0"/>
+          </a:p>
+        </p:txBody>
+      </p:sp>
+    </p:spTree>
+    <p:extLst>
+      <p:ext uri="{BB962C8B-B14F-4D97-AF65-F5344CB8AC3E}">
+        <p14:creationId xmlns:p14="http://schemas.microsoft.com/office/powerpoint/2010/main" val="1137771843"/>
+      </p:ext>
+    </p:extLst>
+  </p:cSld>
+  <p:clrMapOvr>
+    <a:masterClrMapping/>
+  </p:clrMapOvr>
+</p:sld>
+</file>
+
+<file path=ppt/slides/slide15.xml><?xml version="1.0" encoding="utf-8"?>
+<p:sld xmlns:a="http://schemas.openxmlformats.org/drawingml/2006/main" xmlns:r="http://schemas.openxmlformats.org/officeDocument/2006/relationships" xmlns:p="http://schemas.openxmlformats.org/presentationml/2006/main">
+  <p:cSld>
+    <p:spTree>
+      <p:nvGrpSpPr>
+        <p:cNvPr id="1" name=""/>
+        <p:cNvGrpSpPr/>
+        <p:nvPr/>
+      </p:nvGrpSpPr>
+      <p:grpSpPr>
+        <a:xfrm>
+          <a:off x="0" y="0"/>
+          <a:ext cx="0" cy="0"/>
+          <a:chOff x="0" y="0"/>
+          <a:chExt cx="0" cy="0"/>
+        </a:xfrm>
+      </p:grpSpPr>
       <p:pic>
         <p:nvPicPr>
           <p:cNvPr id="23553" name="Picture 5" descr="raised_paper.png"/>
@@ -7867,7 +8276,7 @@
           <p:nvPr/>
         </p:nvPicPr>
         <p:blipFill>
-          <a:blip r:embed="rId2">
+          <a:blip r:embed="rId3">
             <a:extLst>
               <a:ext uri="{28A0092B-C50C-407E-A947-70E740481C1C}">
                 <a14:useLocalDpi xmlns:a14="http://schemas.microsoft.com/office/drawing/2010/main" val="0"/>
@@ -7940,7 +8349,7 @@
                 </a:solidFill>
                 <a:latin typeface="Trebuchet MS" charset="0"/>
               </a:rPr>
-              <a:t>Lab Exercise</a:t>
+              <a:t>Lab</a:t>
             </a:r>
             <a:endParaRPr lang="en-US" sz="4800" i="1" dirty="0">
               <a:solidFill>
@@ -9319,7 +9728,25 @@
               <a:rPr lang="en-US" sz="2000" dirty="0" smtClean="0">
                 <a:latin typeface="Monaco" charset="0"/>
               </a:rPr>
-              <a:t>to ' + scale * 100 + '%</a:t>
+              <a:t>to ' + </a:t>
+            </a:r>
+            <a:r>
+              <a:rPr lang="en-US" sz="2000" dirty="0" err="1" smtClean="0">
+                <a:latin typeface="Monaco" charset="0"/>
+              </a:rPr>
+              <a:t>e.scale</a:t>
+            </a:r>
+            <a:r>
+              <a:rPr lang="en-US" sz="2000" dirty="0" smtClean="0">
+                <a:latin typeface="Monaco" charset="0"/>
+              </a:rPr>
+              <a:t> </a:t>
+            </a:r>
+            <a:r>
+              <a:rPr lang="en-US" sz="2000" dirty="0" smtClean="0">
+                <a:latin typeface="Monaco" charset="0"/>
+              </a:rPr>
+              <a:t>* 100 + '%</a:t>
             </a:r>
             <a:r>
               <a:rPr lang="en-US" sz="2000" dirty="0">

</xml_diff>

<commit_message>
Add slide/demo notes plus demo app for module 350
</commit_message>
<xml_diff>
--- a/335.pptx
+++ b/335.pptx
@@ -1301,6 +1301,10 @@
           <a:bodyPr/>
           <a:lstStyle/>
           <a:p>
+            <a:r>
+              <a:rPr lang="en-US" baseline="0" dirty="0" smtClean="0"/>
+              <a:t>In this lab, you will create a scroll view containing a list of baseball players. That list will extend left/right beyond the width of the viewport. When the user taps a player's name, three images of that player will be displayed in a scrollable view located below the scroll view.</a:t>
+            </a:r>
             <a:endParaRPr lang="en-US" baseline="0" dirty="0" smtClean="0"/>
           </a:p>
         </p:txBody>
@@ -1413,11 +1417,7 @@
             </a:r>
             <a:r>
               <a:rPr lang="en-US" baseline="0" dirty="0" smtClean="0"/>
-              <a:t> – it is used to segment detail information about the fugitive, like the fugitive description and their location on a </a:t>
-            </a:r>
-            <a:r>
-              <a:rPr lang="en-US" baseline="0" dirty="0" smtClean="0"/>
-              <a:t>map (unimplemented, but </a:t>
+              <a:t> – it is used to segment detail information about the fugitive, like the fugitive description and their location on a map (unimplemented, but </a:t>
             </a:r>
             <a:r>
               <a:rPr lang="en-US" baseline="0" smtClean="0"/>

</xml_diff>